<commit_message>
constraint satisfaction con 2 approaches
</commit_message>
<xml_diff>
--- a/proyecto cripto-aritmetica/proyectocriptoaritmetica.pptx
+++ b/proyecto cripto-aritmetica/proyectocriptoaritmetica.pptx
@@ -9,11 +9,13 @@
     <p:sldId id="257" r:id="rId3"/>
     <p:sldId id="264" r:id="rId4"/>
     <p:sldId id="263" r:id="rId5"/>
-    <p:sldId id="258" r:id="rId6"/>
-    <p:sldId id="259" r:id="rId7"/>
-    <p:sldId id="260" r:id="rId8"/>
-    <p:sldId id="261" r:id="rId9"/>
-    <p:sldId id="262" r:id="rId10"/>
+    <p:sldId id="265" r:id="rId6"/>
+    <p:sldId id="266" r:id="rId7"/>
+    <p:sldId id="258" r:id="rId8"/>
+    <p:sldId id="259" r:id="rId9"/>
+    <p:sldId id="260" r:id="rId10"/>
+    <p:sldId id="261" r:id="rId11"/>
+    <p:sldId id="262" r:id="rId12"/>
   </p:sldIdLst>
   <p:sldSz cx="12192000" cy="6858000"/>
   <p:notesSz cx="6858000" cy="9144000"/>
@@ -123,7 +125,7 @@
 <file path=ppt/revisionInfo.xml><?xml version="1.0" encoding="utf-8"?>
 <p1510:revInfo xmlns:a="http://schemas.openxmlformats.org/drawingml/2006/main" xmlns:r="http://schemas.openxmlformats.org/officeDocument/2006/relationships" xmlns:p1510="http://schemas.microsoft.com/office/powerpoint/2015/10/main">
   <p1510:revLst>
-    <p1510:client id="{5857EA0F-408E-6944-80D7-11482367583E}" v="653" dt="2023-05-08T05:38:29.136"/>
+    <p1510:client id="{5857EA0F-408E-6944-80D7-11482367583E}" v="823" dt="2023-05-08T10:37:52.980"/>
   </p1510:revLst>
 </p1510:revInfo>
 </file>
@@ -133,7 +135,7 @@
   <pc:docChgLst>
     <pc:chgData name="JAVIER CORRAL LIZARRAGA" userId="0ecefa1b-44b2-4552-a45b-bf44730885c8" providerId="ADAL" clId="{5857EA0F-408E-6944-80D7-11482367583E}"/>
     <pc:docChg chg="undo custSel addSld modSld addMainMaster delMainMaster">
-      <pc:chgData name="JAVIER CORRAL LIZARRAGA" userId="0ecefa1b-44b2-4552-a45b-bf44730885c8" providerId="ADAL" clId="{5857EA0F-408E-6944-80D7-11482367583E}" dt="2023-05-08T07:47:55.322" v="1764" actId="20577"/>
+      <pc:chgData name="JAVIER CORRAL LIZARRAGA" userId="0ecefa1b-44b2-4552-a45b-bf44730885c8" providerId="ADAL" clId="{5857EA0F-408E-6944-80D7-11482367583E}" dt="2023-05-08T10:47:24.561" v="3336" actId="20577"/>
       <pc:docMkLst>
         <pc:docMk/>
       </pc:docMkLst>
@@ -264,7 +266,7 @@
         </pc:spChg>
       </pc:sldChg>
       <pc:sldChg chg="addSp delSp modSp new mod">
-        <pc:chgData name="JAVIER CORRAL LIZARRAGA" userId="0ecefa1b-44b2-4552-a45b-bf44730885c8" providerId="ADAL" clId="{5857EA0F-408E-6944-80D7-11482367583E}" dt="2023-05-07T23:29:46.886" v="893" actId="790"/>
+        <pc:chgData name="JAVIER CORRAL LIZARRAGA" userId="0ecefa1b-44b2-4552-a45b-bf44730885c8" providerId="ADAL" clId="{5857EA0F-408E-6944-80D7-11482367583E}" dt="2023-05-08T10:23:48.071" v="2694"/>
         <pc:sldMkLst>
           <pc:docMk/>
           <pc:sldMk cId="2918832171" sldId="258"/>
@@ -278,7 +280,7 @@
           </ac:spMkLst>
         </pc:spChg>
         <pc:spChg chg="mod">
-          <ac:chgData name="JAVIER CORRAL LIZARRAGA" userId="0ecefa1b-44b2-4552-a45b-bf44730885c8" providerId="ADAL" clId="{5857EA0F-408E-6944-80D7-11482367583E}" dt="2023-05-07T23:29:46.886" v="893" actId="790"/>
+          <ac:chgData name="JAVIER CORRAL LIZARRAGA" userId="0ecefa1b-44b2-4552-a45b-bf44730885c8" providerId="ADAL" clId="{5857EA0F-408E-6944-80D7-11482367583E}" dt="2023-05-08T10:23:48.071" v="2694"/>
           <ac:spMkLst>
             <pc:docMk/>
             <pc:sldMk cId="2918832171" sldId="258"/>
@@ -318,13 +320,13 @@
         </pc:spChg>
       </pc:sldChg>
       <pc:sldChg chg="modSp new mod">
-        <pc:chgData name="JAVIER CORRAL LIZARRAGA" userId="0ecefa1b-44b2-4552-a45b-bf44730885c8" providerId="ADAL" clId="{5857EA0F-408E-6944-80D7-11482367583E}" dt="2023-05-07T23:30:16.643" v="978" actId="20577"/>
+        <pc:chgData name="JAVIER CORRAL LIZARRAGA" userId="0ecefa1b-44b2-4552-a45b-bf44730885c8" providerId="ADAL" clId="{5857EA0F-408E-6944-80D7-11482367583E}" dt="2023-05-08T10:00:08.667" v="2692" actId="20577"/>
         <pc:sldMkLst>
           <pc:docMk/>
           <pc:sldMk cId="1998731749" sldId="260"/>
         </pc:sldMkLst>
         <pc:spChg chg="mod">
-          <ac:chgData name="JAVIER CORRAL LIZARRAGA" userId="0ecefa1b-44b2-4552-a45b-bf44730885c8" providerId="ADAL" clId="{5857EA0F-408E-6944-80D7-11482367583E}" dt="2023-05-07T23:30:16.643" v="978" actId="20577"/>
+          <ac:chgData name="JAVIER CORRAL LIZARRAGA" userId="0ecefa1b-44b2-4552-a45b-bf44730885c8" providerId="ADAL" clId="{5857EA0F-408E-6944-80D7-11482367583E}" dt="2023-05-08T10:00:08.667" v="2692" actId="20577"/>
           <ac:spMkLst>
             <pc:docMk/>
             <pc:sldMk cId="1998731749" sldId="260"/>
@@ -347,15 +349,23 @@
           </ac:spMkLst>
         </pc:spChg>
       </pc:sldChg>
-      <pc:sldChg chg="new">
-        <pc:chgData name="JAVIER CORRAL LIZARRAGA" userId="0ecefa1b-44b2-4552-a45b-bf44730885c8" providerId="ADAL" clId="{5857EA0F-408E-6944-80D7-11482367583E}" dt="2023-05-07T23:11:53.554" v="105" actId="680"/>
+      <pc:sldChg chg="modSp new mod">
+        <pc:chgData name="JAVIER CORRAL LIZARRAGA" userId="0ecefa1b-44b2-4552-a45b-bf44730885c8" providerId="ADAL" clId="{5857EA0F-408E-6944-80D7-11482367583E}" dt="2023-05-08T09:45:49.390" v="1876" actId="27636"/>
         <pc:sldMkLst>
           <pc:docMk/>
           <pc:sldMk cId="4090102367" sldId="262"/>
         </pc:sldMkLst>
+        <pc:spChg chg="mod">
+          <ac:chgData name="JAVIER CORRAL LIZARRAGA" userId="0ecefa1b-44b2-4552-a45b-bf44730885c8" providerId="ADAL" clId="{5857EA0F-408E-6944-80D7-11482367583E}" dt="2023-05-08T09:45:49.390" v="1876" actId="27636"/>
+          <ac:spMkLst>
+            <pc:docMk/>
+            <pc:sldMk cId="4090102367" sldId="262"/>
+            <ac:spMk id="2" creationId="{E41A817E-F51B-CC91-0552-CD6F17FBE6B5}"/>
+          </ac:spMkLst>
+        </pc:spChg>
       </pc:sldChg>
       <pc:sldChg chg="modSp new mod">
-        <pc:chgData name="JAVIER CORRAL LIZARRAGA" userId="0ecefa1b-44b2-4552-a45b-bf44730885c8" providerId="ADAL" clId="{5857EA0F-408E-6944-80D7-11482367583E}" dt="2023-05-07T23:35:46.656" v="994" actId="20577"/>
+        <pc:chgData name="JAVIER CORRAL LIZARRAGA" userId="0ecefa1b-44b2-4552-a45b-bf44730885c8" providerId="ADAL" clId="{5857EA0F-408E-6944-80D7-11482367583E}" dt="2023-05-08T10:47:24.561" v="3336" actId="20577"/>
         <pc:sldMkLst>
           <pc:docMk/>
           <pc:sldMk cId="3115729360" sldId="263"/>
@@ -369,7 +379,7 @@
           </ac:spMkLst>
         </pc:spChg>
         <pc:spChg chg="mod">
-          <ac:chgData name="JAVIER CORRAL LIZARRAGA" userId="0ecefa1b-44b2-4552-a45b-bf44730885c8" providerId="ADAL" clId="{5857EA0F-408E-6944-80D7-11482367583E}" dt="2023-05-07T23:35:46.656" v="994" actId="20577"/>
+          <ac:chgData name="JAVIER CORRAL LIZARRAGA" userId="0ecefa1b-44b2-4552-a45b-bf44730885c8" providerId="ADAL" clId="{5857EA0F-408E-6944-80D7-11482367583E}" dt="2023-05-08T10:47:24.561" v="3336" actId="20577"/>
           <ac:spMkLst>
             <pc:docMk/>
             <pc:sldMk cId="3115729360" sldId="263"/>
@@ -447,6 +457,76 @@
             <ac:spMk id="9" creationId="{B1234B5D-8958-4889-64FF-30A89598710B}"/>
           </ac:spMkLst>
         </pc:spChg>
+      </pc:sldChg>
+      <pc:sldChg chg="addSp modSp new mod">
+        <pc:chgData name="JAVIER CORRAL LIZARRAGA" userId="0ecefa1b-44b2-4552-a45b-bf44730885c8" providerId="ADAL" clId="{5857EA0F-408E-6944-80D7-11482367583E}" dt="2023-05-08T10:34:13.708" v="2910" actId="20577"/>
+        <pc:sldMkLst>
+          <pc:docMk/>
+          <pc:sldMk cId="3855995809" sldId="265"/>
+        </pc:sldMkLst>
+        <pc:spChg chg="mod">
+          <ac:chgData name="JAVIER CORRAL LIZARRAGA" userId="0ecefa1b-44b2-4552-a45b-bf44730885c8" providerId="ADAL" clId="{5857EA0F-408E-6944-80D7-11482367583E}" dt="2023-05-08T10:32:40.548" v="2731" actId="20577"/>
+          <ac:spMkLst>
+            <pc:docMk/>
+            <pc:sldMk cId="3855995809" sldId="265"/>
+            <ac:spMk id="2" creationId="{C99E81AC-583B-1199-3C3C-5DA62F062139}"/>
+          </ac:spMkLst>
+        </pc:spChg>
+        <pc:spChg chg="mod">
+          <ac:chgData name="JAVIER CORRAL LIZARRAGA" userId="0ecefa1b-44b2-4552-a45b-bf44730885c8" providerId="ADAL" clId="{5857EA0F-408E-6944-80D7-11482367583E}" dt="2023-05-08T10:34:03.425" v="2903" actId="20577"/>
+          <ac:spMkLst>
+            <pc:docMk/>
+            <pc:sldMk cId="3855995809" sldId="265"/>
+            <ac:spMk id="3" creationId="{B51B1ABA-B230-BFDE-2540-162EA0358B85}"/>
+          </ac:spMkLst>
+        </pc:spChg>
+        <pc:spChg chg="add mod">
+          <ac:chgData name="JAVIER CORRAL LIZARRAGA" userId="0ecefa1b-44b2-4552-a45b-bf44730885c8" providerId="ADAL" clId="{5857EA0F-408E-6944-80D7-11482367583E}" dt="2023-05-08T10:34:13.708" v="2910" actId="20577"/>
+          <ac:spMkLst>
+            <pc:docMk/>
+            <pc:sldMk cId="3855995809" sldId="265"/>
+            <ac:spMk id="4" creationId="{A3F68E71-A018-2176-88DE-0B5B00AE64DE}"/>
+          </ac:spMkLst>
+        </pc:spChg>
+      </pc:sldChg>
+      <pc:sldChg chg="addSp delSp modSp new mod">
+        <pc:chgData name="JAVIER CORRAL LIZARRAGA" userId="0ecefa1b-44b2-4552-a45b-bf44730885c8" providerId="ADAL" clId="{5857EA0F-408E-6944-80D7-11482367583E}" dt="2023-05-08T10:44:41.377" v="3137" actId="113"/>
+        <pc:sldMkLst>
+          <pc:docMk/>
+          <pc:sldMk cId="1782613940" sldId="266"/>
+        </pc:sldMkLst>
+        <pc:spChg chg="mod">
+          <ac:chgData name="JAVIER CORRAL LIZARRAGA" userId="0ecefa1b-44b2-4552-a45b-bf44730885c8" providerId="ADAL" clId="{5857EA0F-408E-6944-80D7-11482367583E}" dt="2023-05-08T10:44:12.643" v="3130" actId="14100"/>
+          <ac:spMkLst>
+            <pc:docMk/>
+            <pc:sldMk cId="1782613940" sldId="266"/>
+            <ac:spMk id="2" creationId="{6400A5F9-9B7A-97FF-1DB0-C5571B95B630}"/>
+          </ac:spMkLst>
+        </pc:spChg>
+        <pc:spChg chg="del mod">
+          <ac:chgData name="JAVIER CORRAL LIZARRAGA" userId="0ecefa1b-44b2-4552-a45b-bf44730885c8" providerId="ADAL" clId="{5857EA0F-408E-6944-80D7-11482367583E}" dt="2023-05-08T10:38:07.846" v="3024" actId="478"/>
+          <ac:spMkLst>
+            <pc:docMk/>
+            <pc:sldMk cId="1782613940" sldId="266"/>
+            <ac:spMk id="3" creationId="{73BEF38D-6334-6921-D7FB-EB7FC3AB0C82}"/>
+          </ac:spMkLst>
+        </pc:spChg>
+        <pc:spChg chg="add mod">
+          <ac:chgData name="JAVIER CORRAL LIZARRAGA" userId="0ecefa1b-44b2-4552-a45b-bf44730885c8" providerId="ADAL" clId="{5857EA0F-408E-6944-80D7-11482367583E}" dt="2023-05-08T10:33:45.188" v="2896" actId="20577"/>
+          <ac:spMkLst>
+            <pc:docMk/>
+            <pc:sldMk cId="1782613940" sldId="266"/>
+            <ac:spMk id="4" creationId="{56435A6C-A9FC-6161-4FC8-828DF0589826}"/>
+          </ac:spMkLst>
+        </pc:spChg>
+        <pc:graphicFrameChg chg="add mod modGraphic">
+          <ac:chgData name="JAVIER CORRAL LIZARRAGA" userId="0ecefa1b-44b2-4552-a45b-bf44730885c8" providerId="ADAL" clId="{5857EA0F-408E-6944-80D7-11482367583E}" dt="2023-05-08T10:44:41.377" v="3137" actId="113"/>
+          <ac:graphicFrameMkLst>
+            <pc:docMk/>
+            <pc:sldMk cId="1782613940" sldId="266"/>
+            <ac:graphicFrameMk id="5" creationId="{64C6ECD4-B29C-A83C-C24E-1FC7E00B23FF}"/>
+          </ac:graphicFrameMkLst>
+        </pc:graphicFrameChg>
       </pc:sldChg>
       <pc:sldMasterChg chg="del delSldLayout">
         <pc:chgData name="JAVIER CORRAL LIZARRAGA" userId="0ecefa1b-44b2-4552-a45b-bf44730885c8" providerId="ADAL" clId="{5857EA0F-408E-6944-80D7-11482367583E}" dt="2023-05-07T23:11:02.807" v="1" actId="26606"/>
@@ -5403,6 +5483,176 @@
     <p:extLst>
       <p:ext uri="{BB962C8B-B14F-4D97-AF65-F5344CB8AC3E}">
         <p14:creationId xmlns:p14="http://schemas.microsoft.com/office/powerpoint/2010/main" val="1770572227"/>
+      </p:ext>
+    </p:extLst>
+  </p:cSld>
+  <p:clrMapOvr>
+    <a:masterClrMapping/>
+  </p:clrMapOvr>
+</p:sld>
+</file>
+
+<file path=ppt/slides/slide10.xml><?xml version="1.0" encoding="utf-8"?>
+<p:sld xmlns:a="http://schemas.openxmlformats.org/drawingml/2006/main" xmlns:r="http://schemas.openxmlformats.org/officeDocument/2006/relationships" xmlns:p="http://schemas.openxmlformats.org/presentationml/2006/main">
+  <p:cSld>
+    <p:spTree>
+      <p:nvGrpSpPr>
+        <p:cNvPr id="1" name=""/>
+        <p:cNvGrpSpPr/>
+        <p:nvPr/>
+      </p:nvGrpSpPr>
+      <p:grpSpPr>
+        <a:xfrm>
+          <a:off x="0" y="0"/>
+          <a:ext cx="0" cy="0"/>
+          <a:chOff x="0" y="0"/>
+          <a:chExt cx="0" cy="0"/>
+        </a:xfrm>
+      </p:grpSpPr>
+      <p:sp>
+        <p:nvSpPr>
+          <p:cNvPr id="2" name="Title 1">
+            <a:extLst>
+              <a:ext uri="{FF2B5EF4-FFF2-40B4-BE49-F238E27FC236}">
+                <a16:creationId xmlns:a16="http://schemas.microsoft.com/office/drawing/2014/main" id="{19B59A8E-2F4A-2A58-50EE-006638771964}"/>
+              </a:ext>
+            </a:extLst>
+          </p:cNvPr>
+          <p:cNvSpPr>
+            <a:spLocks noGrp="1"/>
+          </p:cNvSpPr>
+          <p:nvPr>
+            <p:ph type="title"/>
+          </p:nvPr>
+        </p:nvSpPr>
+        <p:spPr/>
+        <p:txBody>
+          <a:bodyPr>
+            <a:normAutofit fontScale="90000"/>
+          </a:bodyPr>
+          <a:lstStyle/>
+          <a:p>
+            <a:r>
+              <a:rPr lang="en-MX"/>
+              <a:t>Replicando la funcionalidad de propagacion de restricciones</a:t>
+            </a:r>
+          </a:p>
+        </p:txBody>
+      </p:sp>
+      <p:sp>
+        <p:nvSpPr>
+          <p:cNvPr id="3" name="Content Placeholder 2">
+            <a:extLst>
+              <a:ext uri="{FF2B5EF4-FFF2-40B4-BE49-F238E27FC236}">
+                <a16:creationId xmlns:a16="http://schemas.microsoft.com/office/drawing/2014/main" id="{C53BFB3D-E623-87B2-400B-2460BD97A40C}"/>
+              </a:ext>
+            </a:extLst>
+          </p:cNvPr>
+          <p:cNvSpPr>
+            <a:spLocks noGrp="1"/>
+          </p:cNvSpPr>
+          <p:nvPr>
+            <p:ph idx="1"/>
+          </p:nvPr>
+        </p:nvSpPr>
+        <p:spPr/>
+        <p:txBody>
+          <a:bodyPr/>
+          <a:lstStyle/>
+          <a:p>
+            <a:endParaRPr lang="en-MX"/>
+          </a:p>
+        </p:txBody>
+      </p:sp>
+    </p:spTree>
+    <p:extLst>
+      <p:ext uri="{BB962C8B-B14F-4D97-AF65-F5344CB8AC3E}">
+        <p14:creationId xmlns:p14="http://schemas.microsoft.com/office/powerpoint/2010/main" val="2501368927"/>
+      </p:ext>
+    </p:extLst>
+  </p:cSld>
+  <p:clrMapOvr>
+    <a:masterClrMapping/>
+  </p:clrMapOvr>
+</p:sld>
+</file>
+
+<file path=ppt/slides/slide11.xml><?xml version="1.0" encoding="utf-8"?>
+<p:sld xmlns:a="http://schemas.openxmlformats.org/drawingml/2006/main" xmlns:r="http://schemas.openxmlformats.org/officeDocument/2006/relationships" xmlns:p="http://schemas.openxmlformats.org/presentationml/2006/main">
+  <p:cSld>
+    <p:spTree>
+      <p:nvGrpSpPr>
+        <p:cNvPr id="1" name=""/>
+        <p:cNvGrpSpPr/>
+        <p:nvPr/>
+      </p:nvGrpSpPr>
+      <p:grpSpPr>
+        <a:xfrm>
+          <a:off x="0" y="0"/>
+          <a:ext cx="0" cy="0"/>
+          <a:chOff x="0" y="0"/>
+          <a:chExt cx="0" cy="0"/>
+        </a:xfrm>
+      </p:grpSpPr>
+      <p:sp>
+        <p:nvSpPr>
+          <p:cNvPr id="2" name="Title 1">
+            <a:extLst>
+              <a:ext uri="{FF2B5EF4-FFF2-40B4-BE49-F238E27FC236}">
+                <a16:creationId xmlns:a16="http://schemas.microsoft.com/office/drawing/2014/main" id="{E41A817E-F51B-CC91-0552-CD6F17FBE6B5}"/>
+              </a:ext>
+            </a:extLst>
+          </p:cNvPr>
+          <p:cNvSpPr>
+            <a:spLocks noGrp="1"/>
+          </p:cNvSpPr>
+          <p:nvPr>
+            <p:ph type="title"/>
+          </p:nvPr>
+        </p:nvSpPr>
+        <p:spPr/>
+        <p:txBody>
+          <a:bodyPr>
+            <a:normAutofit/>
+          </a:bodyPr>
+          <a:lstStyle/>
+          <a:p>
+            <a:r>
+              <a:rPr lang="en-MX" dirty="0"/>
+              <a:t>Conclusiones</a:t>
+            </a:r>
+          </a:p>
+        </p:txBody>
+      </p:sp>
+      <p:sp>
+        <p:nvSpPr>
+          <p:cNvPr id="3" name="Content Placeholder 2">
+            <a:extLst>
+              <a:ext uri="{FF2B5EF4-FFF2-40B4-BE49-F238E27FC236}">
+                <a16:creationId xmlns:a16="http://schemas.microsoft.com/office/drawing/2014/main" id="{63BA54E2-05BE-062F-5E34-D20774305F1C}"/>
+              </a:ext>
+            </a:extLst>
+          </p:cNvPr>
+          <p:cNvSpPr>
+            <a:spLocks noGrp="1"/>
+          </p:cNvSpPr>
+          <p:nvPr>
+            <p:ph idx="1"/>
+          </p:nvPr>
+        </p:nvSpPr>
+        <p:spPr/>
+        <p:txBody>
+          <a:bodyPr/>
+          <a:lstStyle/>
+          <a:p>
+            <a:endParaRPr lang="en-MX"/>
+          </a:p>
+        </p:txBody>
+      </p:sp>
+    </p:spTree>
+    <p:extLst>
+      <p:ext uri="{BB962C8B-B14F-4D97-AF65-F5344CB8AC3E}">
+        <p14:creationId xmlns:p14="http://schemas.microsoft.com/office/powerpoint/2010/main" val="4090102367"/>
       </p:ext>
     </p:extLst>
   </p:cSld>
@@ -6641,25 +6891,83 @@
           <a:bodyPr/>
           <a:lstStyle/>
           <a:p>
-            <a:endParaRPr lang="en-MX"/>
-          </a:p>
-          <a:p>
-            <a:endParaRPr lang="en-MX"/>
-          </a:p>
-          <a:p>
-            <a:r>
-              <a:rPr lang="en-MX"/>
-              <a:t>Backtracking </a:t>
-            </a:r>
-          </a:p>
-          <a:p>
-            <a:endParaRPr lang="en-MX"/>
-          </a:p>
-          <a:p>
             <a:pPr marL="0" indent="0">
               <a:buNone/>
             </a:pPr>
-            <a:endParaRPr lang="en-MX"/>
+            <a:r>
+              <a:rPr lang="en-MX" dirty="0"/>
+              <a:t>Descubriendo las restricciones</a:t>
+            </a:r>
+          </a:p>
+          <a:p>
+            <a:r>
+              <a:rPr lang="en-US" dirty="0"/>
+              <a:t>R</a:t>
+            </a:r>
+            <a:r>
+              <a:rPr lang="en-MX" dirty="0"/>
+              <a:t>estricciones independientes de las letras</a:t>
+            </a:r>
+          </a:p>
+          <a:p>
+            <a:pPr lvl="1"/>
+            <a:r>
+              <a:rPr lang="en-US" dirty="0"/>
+              <a:t>L</a:t>
+            </a:r>
+            <a:r>
+              <a:rPr lang="en-MX" dirty="0"/>
+              <a:t>a suma de dos numeros de 4 digitos da un numero (</a:t>
+            </a:r>
+            <a:r>
+              <a:rPr lang="en-MX" b="1" dirty="0"/>
+              <a:t>12,698,280 </a:t>
+            </a:r>
+            <a:r>
+              <a:rPr lang="en-MX" dirty="0"/>
+              <a:t>posibilidades)</a:t>
+            </a:r>
+          </a:p>
+          <a:p>
+            <a:pPr lvl="1"/>
+            <a:r>
+              <a:rPr lang="en-US" dirty="0"/>
+              <a:t>E</a:t>
+            </a:r>
+            <a:r>
+              <a:rPr lang="en-MX" dirty="0"/>
+              <a:t>l resultado es de 5 digitos (</a:t>
+            </a:r>
+            <a:r>
+              <a:rPr lang="en-MX" b="1" dirty="0"/>
+              <a:t>6,347,880 </a:t>
+            </a:r>
+            <a:r>
+              <a:rPr lang="en-MX" dirty="0"/>
+              <a:t>posibilidades)</a:t>
+            </a:r>
+          </a:p>
+          <a:p>
+            <a:pPr lvl="1"/>
+            <a:r>
+              <a:rPr lang="en-MX" dirty="0"/>
+              <a:t>Todos los digitos son distintos entre si (</a:t>
+            </a:r>
+            <a:r>
+              <a:rPr lang="en-MX" b="1" dirty="0"/>
+              <a:t>1,683,926</a:t>
+            </a:r>
+            <a:r>
+              <a:rPr lang="en-MX" dirty="0"/>
+              <a:t> posibilidades)</a:t>
+            </a:r>
+          </a:p>
+          <a:p>
+            <a:pPr lvl="1"/>
+            <a:r>
+              <a:rPr lang="en-MX" dirty="0"/>
+              <a:t>Ninguno de los digitos puede comenzar en 0 (restriccion inalcanzable porque ya fue satisfecha por la restriccion de resultado necesariamente de tamaño 5 digitos)</a:t>
+            </a:r>
           </a:p>
         </p:txBody>
       </p:sp>
@@ -6698,7 +7006,7 @@
           <p:cNvPr id="2" name="Title 1">
             <a:extLst>
               <a:ext uri="{FF2B5EF4-FFF2-40B4-BE49-F238E27FC236}">
-                <a16:creationId xmlns:a16="http://schemas.microsoft.com/office/drawing/2014/main" id="{7426BCA4-B34E-957B-7CA5-FCD61E1CBCC5}"/>
+                <a16:creationId xmlns:a16="http://schemas.microsoft.com/office/drawing/2014/main" id="{C99E81AC-583B-1199-3C3C-5DA62F062139}"/>
               </a:ext>
             </a:extLst>
           </p:cNvPr>
@@ -6707,36 +7015,6 @@
           </p:cNvSpPr>
           <p:nvPr>
             <p:ph type="title"/>
-          </p:nvPr>
-        </p:nvSpPr>
-        <p:spPr/>
-        <p:txBody>
-          <a:bodyPr>
-            <a:normAutofit/>
-          </a:bodyPr>
-          <a:lstStyle/>
-          <a:p>
-            <a:r>
-              <a:rPr lang="en-MX"/>
-              <a:t>Busqueda dirigida (heuristicas potenciales)</a:t>
-            </a:r>
-          </a:p>
-        </p:txBody>
-      </p:sp>
-      <p:sp>
-        <p:nvSpPr>
-          <p:cNvPr id="3" name="Content Placeholder 2">
-            <a:extLst>
-              <a:ext uri="{FF2B5EF4-FFF2-40B4-BE49-F238E27FC236}">
-                <a16:creationId xmlns:a16="http://schemas.microsoft.com/office/drawing/2014/main" id="{63FDC4DB-8938-E46C-7AF2-BCB3C450ED3C}"/>
-              </a:ext>
-            </a:extLst>
-          </p:cNvPr>
-          <p:cNvSpPr>
-            <a:spLocks noGrp="1"/>
-          </p:cNvSpPr>
-          <p:nvPr>
-            <p:ph idx="1"/>
           </p:nvPr>
         </p:nvSpPr>
         <p:spPr/>
@@ -6745,48 +7023,395 @@
           <a:lstStyle/>
           <a:p>
             <a:r>
-              <a:rPr lang="en-US"/>
-              <a:t>P</a:t>
-            </a:r>
-            <a:r>
-              <a:rPr lang="en-MX"/>
-              <a:t>ropagacion de restricciones</a:t>
-            </a:r>
-            <a:endParaRPr lang="en-US"/>
-          </a:p>
-          <a:p>
-            <a:r>
-              <a:rPr lang="es-ES"/>
-              <a:t>Recocido simulado</a:t>
-            </a:r>
-            <a:endParaRPr lang="en-MX"/>
-          </a:p>
-          <a:p>
-            <a:r>
-              <a:rPr lang="es-ES_tradnl"/>
-              <a:t>Algoritmos</a:t>
-            </a:r>
-            <a:r>
-              <a:rPr lang="en-US"/>
-              <a:t> e</a:t>
-            </a:r>
-            <a:r>
-              <a:rPr lang="en-MX"/>
-              <a:t>volutivos</a:t>
-            </a:r>
-          </a:p>
-          <a:p>
-            <a:endParaRPr lang="en-MX"/>
-          </a:p>
-          <a:p>
-            <a:endParaRPr lang="en-MX"/>
+              <a:rPr lang="es-ES_tradnl" dirty="0"/>
+              <a:t>Satisfacción de restricciones </a:t>
+            </a:r>
+          </a:p>
+        </p:txBody>
+      </p:sp>
+      <mc:AlternateContent xmlns:mc="http://schemas.openxmlformats.org/markup-compatibility/2006">
+        <mc:Choice xmlns:a14="http://schemas.microsoft.com/office/drawing/2010/main" Requires="a14">
+          <p:sp>
+            <p:nvSpPr>
+              <p:cNvPr id="3" name="Content Placeholder 2">
+                <a:extLst>
+                  <a:ext uri="{FF2B5EF4-FFF2-40B4-BE49-F238E27FC236}">
+                    <a16:creationId xmlns:a16="http://schemas.microsoft.com/office/drawing/2014/main" id="{B51B1ABA-B230-BFDE-2540-162EA0358B85}"/>
+                  </a:ext>
+                </a:extLst>
+              </p:cNvPr>
+              <p:cNvSpPr>
+                <a:spLocks noGrp="1"/>
+              </p:cNvSpPr>
+              <p:nvPr>
+                <p:ph idx="1"/>
+              </p:nvPr>
+            </p:nvSpPr>
+            <p:spPr/>
+            <p:txBody>
+              <a:bodyPr>
+                <a:noAutofit/>
+              </a:bodyPr>
+              <a:lstStyle/>
+              <a:p>
+                <a:pPr marL="0" indent="0">
+                  <a:buNone/>
+                </a:pPr>
+                <a14:m>
+                  <m:oMathPara xmlns:m="http://schemas.openxmlformats.org/officeDocument/2006/math">
+                    <m:oMathParaPr>
+                      <m:jc m:val="centerGroup"/>
+                    </m:oMathParaPr>
+                    <m:oMath xmlns:m="http://schemas.openxmlformats.org/officeDocument/2006/math">
+                      <m:f>
+                        <m:fPr>
+                          <m:ctrlPr>
+                            <a:rPr lang="en-US" sz="3600" i="1" dirty="0" smtClean="0">
+                              <a:latin typeface="Cambria Math" panose="02040503050406030204" pitchFamily="18" charset="0"/>
+                            </a:rPr>
+                          </m:ctrlPr>
+                        </m:fPr>
+                        <m:num>
+                          <m:eqArr>
+                            <m:eqArrPr>
+                              <m:ctrlPr>
+                                <a:rPr lang="en-US" sz="3600" i="1" dirty="0">
+                                  <a:latin typeface="Cambria Math" panose="02040503050406030204" pitchFamily="18" charset="0"/>
+                                </a:rPr>
+                              </m:ctrlPr>
+                            </m:eqArrPr>
+                            <m:e>
+                              <m:r>
+                                <a:rPr lang="en-US" sz="3600" i="1" dirty="0">
+                                  <a:latin typeface="Cambria Math" panose="02040503050406030204" pitchFamily="18" charset="0"/>
+                                </a:rPr>
+                                <m:t>1000∗</m:t>
+                              </m:r>
+                              <m:r>
+                                <a:rPr lang="en-US" sz="3600" b="1" i="1" dirty="0">
+                                  <a:latin typeface="Cambria Math" panose="02040503050406030204" pitchFamily="18" charset="0"/>
+                                </a:rPr>
+                                <m:t>𝑺</m:t>
+                              </m:r>
+                              <m:r>
+                                <a:rPr lang="en-US" sz="3600" i="1" dirty="0">
+                                  <a:latin typeface="Cambria Math" panose="02040503050406030204" pitchFamily="18" charset="0"/>
+                                </a:rPr>
+                                <m:t> + 100∗</m:t>
+                              </m:r>
+                              <m:r>
+                                <a:rPr lang="en-US" sz="3600" b="1" i="1" dirty="0">
+                                  <a:latin typeface="Cambria Math" panose="02040503050406030204" pitchFamily="18" charset="0"/>
+                                </a:rPr>
+                                <m:t>𝑬</m:t>
+                              </m:r>
+                              <m:r>
+                                <a:rPr lang="en-US" sz="3600" i="1" dirty="0">
+                                  <a:latin typeface="Cambria Math" panose="02040503050406030204" pitchFamily="18" charset="0"/>
+                                </a:rPr>
+                                <m:t> + 10∗</m:t>
+                              </m:r>
+                              <m:r>
+                                <a:rPr lang="en-US" sz="3600" b="1" i="1" dirty="0">
+                                  <a:latin typeface="Cambria Math" panose="02040503050406030204" pitchFamily="18" charset="0"/>
+                                </a:rPr>
+                                <m:t>𝑵</m:t>
+                              </m:r>
+                              <m:r>
+                                <a:rPr lang="en-US" sz="3600" i="1" dirty="0">
+                                  <a:latin typeface="Cambria Math" panose="02040503050406030204" pitchFamily="18" charset="0"/>
+                                </a:rPr>
+                                <m:t> + </m:t>
+                              </m:r>
+                              <m:r>
+                                <a:rPr lang="en-US" sz="3600" b="1" i="1" dirty="0">
+                                  <a:latin typeface="Cambria Math" panose="02040503050406030204" pitchFamily="18" charset="0"/>
+                                </a:rPr>
+                                <m:t>𝑫</m:t>
+                              </m:r>
+                              <m:r>
+                                <a:rPr lang="en-US" sz="3600" i="1" dirty="0">
+                                  <a:latin typeface="Cambria Math" panose="02040503050406030204" pitchFamily="18" charset="0"/>
+                                </a:rPr>
+                                <m:t> </m:t>
+                              </m:r>
+                            </m:e>
+                            <m:e>
+                              <m:r>
+                                <a:rPr lang="en-US" sz="3600" i="1" dirty="0">
+                                  <a:latin typeface="Cambria Math" panose="02040503050406030204" pitchFamily="18" charset="0"/>
+                                </a:rPr>
+                                <m:t>+ 1000∗</m:t>
+                              </m:r>
+                              <m:r>
+                                <a:rPr lang="en-US" sz="3600" b="1" i="1" dirty="0">
+                                  <a:latin typeface="Cambria Math" panose="02040503050406030204" pitchFamily="18" charset="0"/>
+                                </a:rPr>
+                                <m:t>𝑴</m:t>
+                              </m:r>
+                              <m:r>
+                                <a:rPr lang="en-US" sz="3600" i="1" dirty="0">
+                                  <a:latin typeface="Cambria Math" panose="02040503050406030204" pitchFamily="18" charset="0"/>
+                                </a:rPr>
+                                <m:t> + 100∗</m:t>
+                              </m:r>
+                              <m:r>
+                                <a:rPr lang="en-US" sz="3600" b="1" i="1" dirty="0">
+                                  <a:latin typeface="Cambria Math" panose="02040503050406030204" pitchFamily="18" charset="0"/>
+                                </a:rPr>
+                                <m:t>𝑶</m:t>
+                              </m:r>
+                              <m:r>
+                                <a:rPr lang="en-US" sz="3600" i="1" dirty="0">
+                                  <a:latin typeface="Cambria Math" panose="02040503050406030204" pitchFamily="18" charset="0"/>
+                                </a:rPr>
+                                <m:t> + 10∗</m:t>
+                              </m:r>
+                              <m:r>
+                                <a:rPr lang="en-US" sz="3600" b="1" i="1" dirty="0">
+                                  <a:latin typeface="Cambria Math" panose="02040503050406030204" pitchFamily="18" charset="0"/>
+                                </a:rPr>
+                                <m:t>𝑹</m:t>
+                              </m:r>
+                              <m:r>
+                                <a:rPr lang="en-US" sz="3600" i="1" dirty="0">
+                                  <a:latin typeface="Cambria Math" panose="02040503050406030204" pitchFamily="18" charset="0"/>
+                                </a:rPr>
+                                <m:t> + </m:t>
+                              </m:r>
+                              <m:r>
+                                <a:rPr lang="en-US" sz="3600" b="1" i="1" dirty="0">
+                                  <a:latin typeface="Cambria Math" panose="02040503050406030204" pitchFamily="18" charset="0"/>
+                                </a:rPr>
+                                <m:t>𝑬</m:t>
+                              </m:r>
+                            </m:e>
+                          </m:eqArr>
+                        </m:num>
+                        <m:den>
+                          <m:r>
+                            <a:rPr lang="en-US" sz="3600" i="1" dirty="0">
+                              <a:latin typeface="Cambria Math" panose="02040503050406030204" pitchFamily="18" charset="0"/>
+                            </a:rPr>
+                            <m:t>= 10000∗</m:t>
+                          </m:r>
+                          <m:r>
+                            <a:rPr lang="en-US" sz="3600" b="1" i="1" dirty="0">
+                              <a:latin typeface="Cambria Math" panose="02040503050406030204" pitchFamily="18" charset="0"/>
+                            </a:rPr>
+                            <m:t>𝑴</m:t>
+                          </m:r>
+                          <m:r>
+                            <a:rPr lang="en-US" sz="3600" i="1" dirty="0">
+                              <a:latin typeface="Cambria Math" panose="02040503050406030204" pitchFamily="18" charset="0"/>
+                            </a:rPr>
+                            <m:t> + 1000∗</m:t>
+                          </m:r>
+                          <m:r>
+                            <a:rPr lang="en-US" sz="3600" b="1" i="1" dirty="0">
+                              <a:latin typeface="Cambria Math" panose="02040503050406030204" pitchFamily="18" charset="0"/>
+                            </a:rPr>
+                            <m:t>𝑶</m:t>
+                          </m:r>
+                          <m:r>
+                            <a:rPr lang="en-US" sz="3600" i="1" dirty="0">
+                              <a:latin typeface="Cambria Math" panose="02040503050406030204" pitchFamily="18" charset="0"/>
+                            </a:rPr>
+                            <m:t> + 100∗</m:t>
+                          </m:r>
+                          <m:r>
+                            <a:rPr lang="en-US" sz="3600" b="1" i="1" dirty="0">
+                              <a:latin typeface="Cambria Math" panose="02040503050406030204" pitchFamily="18" charset="0"/>
+                            </a:rPr>
+                            <m:t>𝑵</m:t>
+                          </m:r>
+                          <m:r>
+                            <a:rPr lang="en-US" sz="3600" i="1" dirty="0">
+                              <a:latin typeface="Cambria Math" panose="02040503050406030204" pitchFamily="18" charset="0"/>
+                            </a:rPr>
+                            <m:t> + 10∗</m:t>
+                          </m:r>
+                          <m:r>
+                            <a:rPr lang="en-US" sz="3600" b="1" i="1" dirty="0">
+                              <a:latin typeface="Cambria Math" panose="02040503050406030204" pitchFamily="18" charset="0"/>
+                            </a:rPr>
+                            <m:t>𝑬</m:t>
+                          </m:r>
+                          <m:r>
+                            <a:rPr lang="en-US" sz="3600" i="1" dirty="0">
+                              <a:latin typeface="Cambria Math" panose="02040503050406030204" pitchFamily="18" charset="0"/>
+                            </a:rPr>
+                            <m:t> + </m:t>
+                          </m:r>
+                          <m:r>
+                            <a:rPr lang="en-US" sz="3600" b="1" i="1" dirty="0">
+                              <a:latin typeface="Cambria Math" panose="02040503050406030204" pitchFamily="18" charset="0"/>
+                            </a:rPr>
+                            <m:t>𝒀</m:t>
+                          </m:r>
+                          <m:r>
+                            <m:rPr>
+                              <m:nor/>
+                            </m:rPr>
+                            <a:rPr lang="es-ES_tradnl" sz="3600" dirty="0"/>
+                            <m:t> </m:t>
+                          </m:r>
+                        </m:den>
+                      </m:f>
+                    </m:oMath>
+                  </m:oMathPara>
+                </a14:m>
+                <a:endParaRPr lang="es-ES_tradnl" sz="3600" dirty="0"/>
+              </a:p>
+              <a:p>
+                <a:pPr marL="0" indent="0">
+                  <a:buNone/>
+                </a:pPr>
+                <a:endParaRPr lang="en-US" sz="3200" dirty="0"/>
+              </a:p>
+              <a:p>
+                <a:pPr marL="0" indent="0">
+                  <a:buNone/>
+                </a:pPr>
+                <a14:m>
+                  <m:oMathPara xmlns:m="http://schemas.openxmlformats.org/officeDocument/2006/math">
+                    <m:oMathParaPr>
+                      <m:jc m:val="centerGroup"/>
+                    </m:oMathParaPr>
+                    <m:oMath xmlns:m="http://schemas.openxmlformats.org/officeDocument/2006/math">
+                      <m:r>
+                        <a:rPr lang="en-US" sz="3200" b="1" i="1" dirty="0" smtClean="0">
+                          <a:latin typeface="Cambria Math" panose="02040503050406030204" pitchFamily="18" charset="0"/>
+                        </a:rPr>
+                        <m:t>𝑺</m:t>
+                      </m:r>
+                      <m:r>
+                        <a:rPr lang="en-US" sz="3200" i="1" dirty="0" smtClean="0">
+                          <a:latin typeface="Cambria Math" panose="02040503050406030204" pitchFamily="18" charset="0"/>
+                        </a:rPr>
+                        <m:t> ≠ 0 </m:t>
+                      </m:r>
+                      <m:r>
+                        <a:rPr lang="es-ES" sz="3200" b="0" i="1" dirty="0" smtClean="0">
+                          <a:latin typeface="Cambria Math" panose="02040503050406030204" pitchFamily="18" charset="0"/>
+                        </a:rPr>
+                        <m:t>𝑦</m:t>
+                      </m:r>
+                      <m:r>
+                        <a:rPr lang="es-ES" sz="3200" b="0" i="1" dirty="0" smtClean="0">
+                          <a:latin typeface="Cambria Math" panose="02040503050406030204" pitchFamily="18" charset="0"/>
+                        </a:rPr>
+                        <m:t> </m:t>
+                      </m:r>
+                      <m:r>
+                        <a:rPr lang="en-US" sz="3200" b="1" i="1" dirty="0" smtClean="0">
+                          <a:latin typeface="Cambria Math" panose="02040503050406030204" pitchFamily="18" charset="0"/>
+                        </a:rPr>
+                        <m:t>𝑴</m:t>
+                      </m:r>
+                      <m:r>
+                        <a:rPr lang="en-US" sz="3200" i="1" dirty="0" smtClean="0">
+                          <a:latin typeface="Cambria Math" panose="02040503050406030204" pitchFamily="18" charset="0"/>
+                        </a:rPr>
+                        <m:t> ≠</m:t>
+                      </m:r>
+                      <m:r>
+                        <a:rPr lang="es-ES" sz="3200" b="0" i="1" dirty="0" smtClean="0">
+                          <a:latin typeface="Cambria Math" panose="02040503050406030204" pitchFamily="18" charset="0"/>
+                        </a:rPr>
+                        <m:t>0</m:t>
+                      </m:r>
+                    </m:oMath>
+                  </m:oMathPara>
+                </a14:m>
+                <a:endParaRPr lang="es-ES_tradnl" sz="3600" dirty="0"/>
+              </a:p>
+            </p:txBody>
+          </p:sp>
+        </mc:Choice>
+        <mc:Fallback>
+          <p:sp>
+            <p:nvSpPr>
+              <p:cNvPr id="3" name="Content Placeholder 2">
+                <a:extLst>
+                  <a:ext uri="{FF2B5EF4-FFF2-40B4-BE49-F238E27FC236}">
+                    <a16:creationId xmlns:a16="http://schemas.microsoft.com/office/drawing/2014/main" id="{B51B1ABA-B230-BFDE-2540-162EA0358B85}"/>
+                  </a:ext>
+                </a:extLst>
+              </p:cNvPr>
+              <p:cNvSpPr>
+                <a:spLocks noGrp="1" noRot="1" noChangeAspect="1" noMove="1" noResize="1" noEditPoints="1" noAdjustHandles="1" noChangeArrowheads="1" noChangeShapeType="1" noTextEdit="1"/>
+              </p:cNvSpPr>
+              <p:nvPr>
+                <p:ph idx="1"/>
+              </p:nvPr>
+            </p:nvSpPr>
+            <p:spPr>
+              <a:blipFill>
+                <a:blip r:embed="rId2"/>
+                <a:stretch>
+                  <a:fillRect/>
+                </a:stretch>
+              </a:blipFill>
+            </p:spPr>
+            <p:txBody>
+              <a:bodyPr/>
+              <a:lstStyle/>
+              <a:p>
+                <a:r>
+                  <a:rPr lang="es-ES_tradnl">
+                    <a:noFill/>
+                  </a:rPr>
+                  <a:t> </a:t>
+                </a:r>
+              </a:p>
+            </p:txBody>
+          </p:sp>
+        </mc:Fallback>
+      </mc:AlternateContent>
+      <p:sp>
+        <p:nvSpPr>
+          <p:cNvPr id="4" name="TextBox 3">
+            <a:extLst>
+              <a:ext uri="{FF2B5EF4-FFF2-40B4-BE49-F238E27FC236}">
+                <a16:creationId xmlns:a16="http://schemas.microsoft.com/office/drawing/2014/main" id="{A3F68E71-A018-2176-88DE-0B5B00AE64DE}"/>
+              </a:ext>
+            </a:extLst>
+          </p:cNvPr>
+          <p:cNvSpPr txBox="1"/>
+          <p:nvPr/>
+        </p:nvSpPr>
+        <p:spPr>
+          <a:xfrm>
+            <a:off x="8743308" y="6384468"/>
+            <a:ext cx="4592548" cy="369332"/>
+          </a:xfrm>
+          <a:prstGeom prst="rect">
+            <a:avLst/>
+          </a:prstGeom>
+          <a:noFill/>
+        </p:spPr>
+        <p:txBody>
+          <a:bodyPr wrap="square" rtlCol="0">
+            <a:spAutoFit/>
+          </a:bodyPr>
+          <a:lstStyle/>
+          <a:p>
+            <a:r>
+              <a:rPr lang="es-ES_tradnl" dirty="0"/>
+              <a:t>*Se utiliza en la función </a:t>
+            </a:r>
+            <a:r>
+              <a:rPr lang="es-ES_tradnl" b="1" i="1" dirty="0"/>
+              <a:t>cons1</a:t>
+            </a:r>
           </a:p>
         </p:txBody>
       </p:sp>
     </p:spTree>
     <p:extLst>
       <p:ext uri="{BB962C8B-B14F-4D97-AF65-F5344CB8AC3E}">
-        <p14:creationId xmlns:p14="http://schemas.microsoft.com/office/powerpoint/2010/main" val="2918832171"/>
+        <p14:creationId xmlns:p14="http://schemas.microsoft.com/office/powerpoint/2010/main" val="3855995809"/>
       </p:ext>
     </p:extLst>
   </p:cSld>
@@ -6818,7 +7443,7 @@
           <p:cNvPr id="2" name="Title 1">
             <a:extLst>
               <a:ext uri="{FF2B5EF4-FFF2-40B4-BE49-F238E27FC236}">
-                <a16:creationId xmlns:a16="http://schemas.microsoft.com/office/drawing/2014/main" id="{C0C6A2D4-DE72-9248-E717-9B45411F3951}"/>
+                <a16:creationId xmlns:a16="http://schemas.microsoft.com/office/drawing/2014/main" id="{6400A5F9-9B7A-97FF-1DB0-C5571B95B630}"/>
               </a:ext>
             </a:extLst>
           </p:cNvPr>
@@ -6829,47 +7454,569 @@
             <p:ph type="title"/>
           </p:nvPr>
         </p:nvSpPr>
-        <p:spPr/>
+        <p:spPr>
+          <a:xfrm>
+            <a:off x="571499" y="689289"/>
+            <a:ext cx="11233507" cy="1084101"/>
+          </a:xfrm>
+        </p:spPr>
         <p:txBody>
-          <a:bodyPr/>
+          <a:bodyPr>
+            <a:normAutofit fontScale="90000"/>
+          </a:bodyPr>
           <a:lstStyle/>
           <a:p>
             <a:r>
-              <a:rPr lang="en-MX"/>
-              <a:t>Intentos </a:t>
+              <a:rPr lang="es-ES_tradnl" dirty="0"/>
+              <a:t>Otro acercamiento a las restricciones (por columnas)</a:t>
             </a:r>
           </a:p>
         </p:txBody>
       </p:sp>
       <p:sp>
         <p:nvSpPr>
-          <p:cNvPr id="3" name="Content Placeholder 2">
-            <a:extLst>
-              <a:ext uri="{FF2B5EF4-FFF2-40B4-BE49-F238E27FC236}">
-                <a16:creationId xmlns:a16="http://schemas.microsoft.com/office/drawing/2014/main" id="{197A3465-25C8-F420-F59F-B47C95AC441A}"/>
-              </a:ext>
-            </a:extLst>
-          </p:cNvPr>
-          <p:cNvSpPr>
-            <a:spLocks noGrp="1"/>
-          </p:cNvSpPr>
-          <p:nvPr>
-            <p:ph idx="1"/>
-          </p:nvPr>
+          <p:cNvPr id="4" name="TextBox 3">
+            <a:extLst>
+              <a:ext uri="{FF2B5EF4-FFF2-40B4-BE49-F238E27FC236}">
+                <a16:creationId xmlns:a16="http://schemas.microsoft.com/office/drawing/2014/main" id="{56435A6C-A9FC-6161-4FC8-828DF0589826}"/>
+              </a:ext>
+            </a:extLst>
+          </p:cNvPr>
+          <p:cNvSpPr txBox="1"/>
+          <p:nvPr/>
         </p:nvSpPr>
-        <p:spPr/>
+        <p:spPr>
+          <a:xfrm>
+            <a:off x="8743308" y="6384468"/>
+            <a:ext cx="4592548" cy="369332"/>
+          </a:xfrm>
+          <a:prstGeom prst="rect">
+            <a:avLst/>
+          </a:prstGeom>
+          <a:noFill/>
+        </p:spPr>
         <p:txBody>
-          <a:bodyPr/>
+          <a:bodyPr wrap="square" rtlCol="0">
+            <a:spAutoFit/>
+          </a:bodyPr>
           <a:lstStyle/>
           <a:p>
-            <a:endParaRPr lang="en-MX"/>
+            <a:r>
+              <a:rPr lang="es-ES_tradnl" dirty="0"/>
+              <a:t>*Se utiliza en la función </a:t>
+            </a:r>
+            <a:r>
+              <a:rPr lang="es-ES_tradnl" b="1" i="1" dirty="0"/>
+              <a:t>cons2</a:t>
+            </a:r>
           </a:p>
         </p:txBody>
       </p:sp>
+      <p:graphicFrame>
+        <p:nvGraphicFramePr>
+          <p:cNvPr id="5" name="Table 5">
+            <a:extLst>
+              <a:ext uri="{FF2B5EF4-FFF2-40B4-BE49-F238E27FC236}">
+                <a16:creationId xmlns:a16="http://schemas.microsoft.com/office/drawing/2014/main" id="{64C6ECD4-B29C-A83C-C24E-1FC7E00B23FF}"/>
+              </a:ext>
+            </a:extLst>
+          </p:cNvPr>
+          <p:cNvGraphicFramePr>
+            <a:graphicFrameLocks noGrp="1"/>
+          </p:cNvGraphicFramePr>
+          <p:nvPr>
+            <p:extLst>
+              <p:ext uri="{D42A27DB-BD31-4B8C-83A1-F6EECF244321}">
+                <p14:modId xmlns:p14="http://schemas.microsoft.com/office/powerpoint/2010/main" val="1738974988"/>
+              </p:ext>
+            </p:extLst>
+          </p:nvPr>
+        </p:nvGraphicFramePr>
+        <p:xfrm>
+          <a:off x="2946400" y="2189435"/>
+          <a:ext cx="6053765" cy="3371465"/>
+        </p:xfrm>
+        <a:graphic>
+          <a:graphicData uri="http://schemas.openxmlformats.org/drawingml/2006/table">
+            <a:tbl>
+              <a:tblPr firstRow="1" bandRow="1">
+                <a:tableStyleId>{2D5ABB26-0587-4C30-8999-92F81FD0307C}</a:tableStyleId>
+              </a:tblPr>
+              <a:tblGrid>
+                <a:gridCol w="1210753">
+                  <a:extLst>
+                    <a:ext uri="{9D8B030D-6E8A-4147-A177-3AD203B41FA5}">
+                      <a16:colId xmlns:a16="http://schemas.microsoft.com/office/drawing/2014/main" val="3931566835"/>
+                    </a:ext>
+                  </a:extLst>
+                </a:gridCol>
+                <a:gridCol w="1210753">
+                  <a:extLst>
+                    <a:ext uri="{9D8B030D-6E8A-4147-A177-3AD203B41FA5}">
+                      <a16:colId xmlns:a16="http://schemas.microsoft.com/office/drawing/2014/main" val="2069260612"/>
+                    </a:ext>
+                  </a:extLst>
+                </a:gridCol>
+                <a:gridCol w="1210753">
+                  <a:extLst>
+                    <a:ext uri="{9D8B030D-6E8A-4147-A177-3AD203B41FA5}">
+                      <a16:colId xmlns:a16="http://schemas.microsoft.com/office/drawing/2014/main" val="2940315613"/>
+                    </a:ext>
+                  </a:extLst>
+                </a:gridCol>
+                <a:gridCol w="1210753">
+                  <a:extLst>
+                    <a:ext uri="{9D8B030D-6E8A-4147-A177-3AD203B41FA5}">
+                      <a16:colId xmlns:a16="http://schemas.microsoft.com/office/drawing/2014/main" val="3601458779"/>
+                    </a:ext>
+                  </a:extLst>
+                </a:gridCol>
+                <a:gridCol w="1210753">
+                  <a:extLst>
+                    <a:ext uri="{9D8B030D-6E8A-4147-A177-3AD203B41FA5}">
+                      <a16:colId xmlns:a16="http://schemas.microsoft.com/office/drawing/2014/main" val="4042483749"/>
+                    </a:ext>
+                  </a:extLst>
+                </a:gridCol>
+              </a:tblGrid>
+              <a:tr h="674293">
+                <a:tc>
+                  <a:txBody>
+                    <a:bodyPr/>
+                    <a:lstStyle/>
+                    <a:p>
+                      <a:r>
+                        <a:rPr lang="es-ES_tradnl" b="1" dirty="0">
+                          <a:solidFill>
+                            <a:srgbClr val="FF0000"/>
+                          </a:solidFill>
+                        </a:rPr>
+                        <a:t>C3</a:t>
+                      </a:r>
+                    </a:p>
+                  </a:txBody>
+                  <a:tcPr/>
+                </a:tc>
+                <a:tc>
+                  <a:txBody>
+                    <a:bodyPr/>
+                    <a:lstStyle/>
+                    <a:p>
+                      <a:r>
+                        <a:rPr lang="es-ES_tradnl" b="1" dirty="0">
+                          <a:solidFill>
+                            <a:srgbClr val="FF0000"/>
+                          </a:solidFill>
+                        </a:rPr>
+                        <a:t>C2</a:t>
+                      </a:r>
+                    </a:p>
+                  </a:txBody>
+                  <a:tcPr/>
+                </a:tc>
+                <a:tc>
+                  <a:txBody>
+                    <a:bodyPr/>
+                    <a:lstStyle/>
+                    <a:p>
+                      <a:r>
+                        <a:rPr lang="es-ES_tradnl" b="1" dirty="0">
+                          <a:solidFill>
+                            <a:srgbClr val="FF0000"/>
+                          </a:solidFill>
+                        </a:rPr>
+                        <a:t>C1</a:t>
+                      </a:r>
+                    </a:p>
+                  </a:txBody>
+                  <a:tcPr/>
+                </a:tc>
+                <a:tc>
+                  <a:txBody>
+                    <a:bodyPr/>
+                    <a:lstStyle/>
+                    <a:p>
+                      <a:r>
+                        <a:rPr lang="es-ES_tradnl" b="1" dirty="0">
+                          <a:solidFill>
+                            <a:srgbClr val="FF0000"/>
+                          </a:solidFill>
+                        </a:rPr>
+                        <a:t>C0</a:t>
+                      </a:r>
+                    </a:p>
+                  </a:txBody>
+                  <a:tcPr/>
+                </a:tc>
+                <a:tc>
+                  <a:txBody>
+                    <a:bodyPr/>
+                    <a:lstStyle/>
+                    <a:p>
+                      <a:endParaRPr lang="es-ES_tradnl" dirty="0"/>
+                    </a:p>
+                  </a:txBody>
+                  <a:tcPr/>
+                </a:tc>
+                <a:extLst>
+                  <a:ext uri="{0D108BD9-81ED-4DB2-BD59-A6C34878D82A}">
+                    <a16:rowId xmlns:a16="http://schemas.microsoft.com/office/drawing/2014/main" val="4084148628"/>
+                  </a:ext>
+                </a:extLst>
+              </a:tr>
+              <a:tr h="674293">
+                <a:tc>
+                  <a:txBody>
+                    <a:bodyPr/>
+                    <a:lstStyle/>
+                    <a:p>
+                      <a:endParaRPr lang="es-ES_tradnl" dirty="0"/>
+                    </a:p>
+                  </a:txBody>
+                  <a:tcPr/>
+                </a:tc>
+                <a:tc>
+                  <a:txBody>
+                    <a:bodyPr/>
+                    <a:lstStyle/>
+                    <a:p>
+                      <a:r>
+                        <a:rPr lang="es-ES_tradnl" b="1" dirty="0"/>
+                        <a:t>S</a:t>
+                      </a:r>
+                    </a:p>
+                  </a:txBody>
+                  <a:tcPr/>
+                </a:tc>
+                <a:tc>
+                  <a:txBody>
+                    <a:bodyPr/>
+                    <a:lstStyle/>
+                    <a:p>
+                      <a:r>
+                        <a:rPr lang="es-ES_tradnl" b="1" dirty="0"/>
+                        <a:t>E</a:t>
+                      </a:r>
+                    </a:p>
+                  </a:txBody>
+                  <a:tcPr/>
+                </a:tc>
+                <a:tc>
+                  <a:txBody>
+                    <a:bodyPr/>
+                    <a:lstStyle/>
+                    <a:p>
+                      <a:r>
+                        <a:rPr lang="es-ES_tradnl" b="1" dirty="0"/>
+                        <a:t>N</a:t>
+                      </a:r>
+                    </a:p>
+                  </a:txBody>
+                  <a:tcPr/>
+                </a:tc>
+                <a:tc>
+                  <a:txBody>
+                    <a:bodyPr/>
+                    <a:lstStyle/>
+                    <a:p>
+                      <a:r>
+                        <a:rPr lang="es-ES_tradnl" b="1" dirty="0"/>
+                        <a:t>D</a:t>
+                      </a:r>
+                    </a:p>
+                  </a:txBody>
+                  <a:tcPr/>
+                </a:tc>
+                <a:extLst>
+                  <a:ext uri="{0D108BD9-81ED-4DB2-BD59-A6C34878D82A}">
+                    <a16:rowId xmlns:a16="http://schemas.microsoft.com/office/drawing/2014/main" val="1184806360"/>
+                  </a:ext>
+                </a:extLst>
+              </a:tr>
+              <a:tr h="674293">
+                <a:tc>
+                  <a:txBody>
+                    <a:bodyPr/>
+                    <a:lstStyle/>
+                    <a:p>
+                      <a:r>
+                        <a:rPr lang="es-ES_tradnl" dirty="0"/>
+                        <a:t>+</a:t>
+                      </a:r>
+                    </a:p>
+                  </a:txBody>
+                  <a:tcPr/>
+                </a:tc>
+                <a:tc>
+                  <a:txBody>
+                    <a:bodyPr/>
+                    <a:lstStyle/>
+                    <a:p>
+                      <a:r>
+                        <a:rPr lang="es-ES_tradnl" b="1" dirty="0"/>
+                        <a:t>M</a:t>
+                      </a:r>
+                    </a:p>
+                  </a:txBody>
+                  <a:tcPr/>
+                </a:tc>
+                <a:tc>
+                  <a:txBody>
+                    <a:bodyPr/>
+                    <a:lstStyle/>
+                    <a:p>
+                      <a:r>
+                        <a:rPr lang="es-ES_tradnl" b="1" dirty="0"/>
+                        <a:t>O</a:t>
+                      </a:r>
+                    </a:p>
+                  </a:txBody>
+                  <a:tcPr/>
+                </a:tc>
+                <a:tc>
+                  <a:txBody>
+                    <a:bodyPr/>
+                    <a:lstStyle/>
+                    <a:p>
+                      <a:r>
+                        <a:rPr lang="es-ES_tradnl" b="1" dirty="0"/>
+                        <a:t>R</a:t>
+                      </a:r>
+                    </a:p>
+                  </a:txBody>
+                  <a:tcPr/>
+                </a:tc>
+                <a:tc>
+                  <a:txBody>
+                    <a:bodyPr/>
+                    <a:lstStyle/>
+                    <a:p>
+                      <a:r>
+                        <a:rPr lang="es-ES_tradnl" b="1" dirty="0"/>
+                        <a:t>E</a:t>
+                      </a:r>
+                    </a:p>
+                  </a:txBody>
+                  <a:tcPr/>
+                </a:tc>
+                <a:extLst>
+                  <a:ext uri="{0D108BD9-81ED-4DB2-BD59-A6C34878D82A}">
+                    <a16:rowId xmlns:a16="http://schemas.microsoft.com/office/drawing/2014/main" val="625695739"/>
+                  </a:ext>
+                </a:extLst>
+              </a:tr>
+              <a:tr h="674293">
+                <a:tc>
+                  <a:txBody>
+                    <a:bodyPr/>
+                    <a:lstStyle/>
+                    <a:p>
+                      <a:r>
+                        <a:rPr lang="es-ES_tradnl" b="1" dirty="0"/>
+                        <a:t>--------------</a:t>
+                      </a:r>
+                    </a:p>
+                  </a:txBody>
+                  <a:tcPr/>
+                </a:tc>
+                <a:tc>
+                  <a:txBody>
+                    <a:bodyPr/>
+                    <a:lstStyle/>
+                    <a:p>
+                      <a:r>
+                        <a:rPr lang="es-ES_tradnl" b="1" dirty="0"/>
+                        <a:t>--------------</a:t>
+                      </a:r>
+                    </a:p>
+                  </a:txBody>
+                  <a:tcPr/>
+                </a:tc>
+                <a:tc>
+                  <a:txBody>
+                    <a:bodyPr/>
+                    <a:lstStyle/>
+                    <a:p>
+                      <a:pPr marL="0" marR="0" lvl="0" indent="0" algn="l" defTabSz="914400" rtl="0" eaLnBrk="1" fontAlgn="auto" latinLnBrk="0" hangingPunct="1">
+                        <a:lnSpc>
+                          <a:spcPct val="100000"/>
+                        </a:lnSpc>
+                        <a:spcBef>
+                          <a:spcPts val="0"/>
+                        </a:spcBef>
+                        <a:spcAft>
+                          <a:spcPts val="0"/>
+                        </a:spcAft>
+                        <a:buClrTx/>
+                        <a:buSzTx/>
+                        <a:buFontTx/>
+                        <a:buNone/>
+                        <a:tabLst/>
+                        <a:defRPr/>
+                      </a:pPr>
+                      <a:r>
+                        <a:rPr lang="es-ES_tradnl" b="1" dirty="0"/>
+                        <a:t>--------------</a:t>
+                      </a:r>
+                    </a:p>
+                    <a:p>
+                      <a:endParaRPr lang="es-ES_tradnl" b="1" dirty="0"/>
+                    </a:p>
+                  </a:txBody>
+                  <a:tcPr/>
+                </a:tc>
+                <a:tc>
+                  <a:txBody>
+                    <a:bodyPr/>
+                    <a:lstStyle/>
+                    <a:p>
+                      <a:pPr marL="0" marR="0" lvl="0" indent="0" algn="l" defTabSz="914400" rtl="0" eaLnBrk="1" fontAlgn="auto" latinLnBrk="0" hangingPunct="1">
+                        <a:lnSpc>
+                          <a:spcPct val="100000"/>
+                        </a:lnSpc>
+                        <a:spcBef>
+                          <a:spcPts val="0"/>
+                        </a:spcBef>
+                        <a:spcAft>
+                          <a:spcPts val="0"/>
+                        </a:spcAft>
+                        <a:buClrTx/>
+                        <a:buSzTx/>
+                        <a:buFontTx/>
+                        <a:buNone/>
+                        <a:tabLst/>
+                        <a:defRPr/>
+                      </a:pPr>
+                      <a:r>
+                        <a:rPr lang="es-ES_tradnl" b="1" dirty="0"/>
+                        <a:t>--------------</a:t>
+                      </a:r>
+                    </a:p>
+                    <a:p>
+                      <a:endParaRPr lang="es-ES_tradnl" b="1" dirty="0"/>
+                    </a:p>
+                  </a:txBody>
+                  <a:tcPr/>
+                </a:tc>
+                <a:tc>
+                  <a:txBody>
+                    <a:bodyPr/>
+                    <a:lstStyle/>
+                    <a:p>
+                      <a:pPr marL="0" marR="0" lvl="0" indent="0" algn="l" defTabSz="914400" rtl="0" eaLnBrk="1" fontAlgn="auto" latinLnBrk="0" hangingPunct="1">
+                        <a:lnSpc>
+                          <a:spcPct val="100000"/>
+                        </a:lnSpc>
+                        <a:spcBef>
+                          <a:spcPts val="0"/>
+                        </a:spcBef>
+                        <a:spcAft>
+                          <a:spcPts val="0"/>
+                        </a:spcAft>
+                        <a:buClrTx/>
+                        <a:buSzTx/>
+                        <a:buFontTx/>
+                        <a:buNone/>
+                        <a:tabLst/>
+                        <a:defRPr/>
+                      </a:pPr>
+                      <a:r>
+                        <a:rPr lang="es-ES_tradnl" b="1" dirty="0"/>
+                        <a:t>--------------</a:t>
+                      </a:r>
+                    </a:p>
+                    <a:p>
+                      <a:endParaRPr lang="es-ES_tradnl" b="1" dirty="0"/>
+                    </a:p>
+                  </a:txBody>
+                  <a:tcPr/>
+                </a:tc>
+                <a:extLst>
+                  <a:ext uri="{0D108BD9-81ED-4DB2-BD59-A6C34878D82A}">
+                    <a16:rowId xmlns:a16="http://schemas.microsoft.com/office/drawing/2014/main" val="4060410725"/>
+                  </a:ext>
+                </a:extLst>
+              </a:tr>
+              <a:tr h="674293">
+                <a:tc>
+                  <a:txBody>
+                    <a:bodyPr/>
+                    <a:lstStyle/>
+                    <a:p>
+                      <a:r>
+                        <a:rPr lang="es-ES_tradnl" b="1" dirty="0"/>
+                        <a:t>M</a:t>
+                      </a:r>
+                    </a:p>
+                  </a:txBody>
+                  <a:tcPr/>
+                </a:tc>
+                <a:tc>
+                  <a:txBody>
+                    <a:bodyPr/>
+                    <a:lstStyle/>
+                    <a:p>
+                      <a:r>
+                        <a:rPr lang="es-ES_tradnl" b="1" dirty="0"/>
+                        <a:t>O</a:t>
+                      </a:r>
+                    </a:p>
+                  </a:txBody>
+                  <a:tcPr/>
+                </a:tc>
+                <a:tc>
+                  <a:txBody>
+                    <a:bodyPr/>
+                    <a:lstStyle/>
+                    <a:p>
+                      <a:r>
+                        <a:rPr lang="es-ES_tradnl" b="1" dirty="0"/>
+                        <a:t>N</a:t>
+                      </a:r>
+                    </a:p>
+                  </a:txBody>
+                  <a:tcPr/>
+                </a:tc>
+                <a:tc>
+                  <a:txBody>
+                    <a:bodyPr/>
+                    <a:lstStyle/>
+                    <a:p>
+                      <a:r>
+                        <a:rPr lang="es-ES_tradnl" b="1" dirty="0"/>
+                        <a:t>E</a:t>
+                      </a:r>
+                    </a:p>
+                  </a:txBody>
+                  <a:tcPr/>
+                </a:tc>
+                <a:tc>
+                  <a:txBody>
+                    <a:bodyPr/>
+                    <a:lstStyle/>
+                    <a:p>
+                      <a:r>
+                        <a:rPr lang="es-ES_tradnl" b="1" dirty="0"/>
+                        <a:t>Y</a:t>
+                      </a:r>
+                    </a:p>
+                  </a:txBody>
+                  <a:tcPr/>
+                </a:tc>
+                <a:extLst>
+                  <a:ext uri="{0D108BD9-81ED-4DB2-BD59-A6C34878D82A}">
+                    <a16:rowId xmlns:a16="http://schemas.microsoft.com/office/drawing/2014/main" val="801383766"/>
+                  </a:ext>
+                </a:extLst>
+              </a:tr>
+            </a:tbl>
+          </a:graphicData>
+        </a:graphic>
+      </p:graphicFrame>
     </p:spTree>
     <p:extLst>
       <p:ext uri="{BB962C8B-B14F-4D97-AF65-F5344CB8AC3E}">
-        <p14:creationId xmlns:p14="http://schemas.microsoft.com/office/powerpoint/2010/main" val="122469425"/>
+        <p14:creationId xmlns:p14="http://schemas.microsoft.com/office/powerpoint/2010/main" val="1782613940"/>
       </p:ext>
     </p:extLst>
   </p:cSld>
@@ -6901,7 +8048,7 @@
           <p:cNvPr id="2" name="Title 1">
             <a:extLst>
               <a:ext uri="{FF2B5EF4-FFF2-40B4-BE49-F238E27FC236}">
-                <a16:creationId xmlns:a16="http://schemas.microsoft.com/office/drawing/2014/main" id="{956CB1D9-A917-7DA5-5FB9-CA4E6BAD5E3F}"/>
+                <a16:creationId xmlns:a16="http://schemas.microsoft.com/office/drawing/2014/main" id="{7426BCA4-B34E-957B-7CA5-FCD61E1CBCC5}"/>
               </a:ext>
             </a:extLst>
           </p:cNvPr>
@@ -6920,8 +8067,8 @@
           <a:lstStyle/>
           <a:p>
             <a:r>
-              <a:rPr lang="en-MX"/>
-              <a:t>Propagación de restricciones con bibliotecas</a:t>
+              <a:rPr lang="en-MX" dirty="0"/>
+              <a:t>Busqueda dirigida (heuristicas potenciales)</a:t>
             </a:r>
           </a:p>
         </p:txBody>
@@ -6931,7 +8078,7 @@
           <p:cNvPr id="3" name="Content Placeholder 2">
             <a:extLst>
               <a:ext uri="{FF2B5EF4-FFF2-40B4-BE49-F238E27FC236}">
-                <a16:creationId xmlns:a16="http://schemas.microsoft.com/office/drawing/2014/main" id="{6752A18D-12CF-A580-465E-B3C00B368E97}"/>
+                <a16:creationId xmlns:a16="http://schemas.microsoft.com/office/drawing/2014/main" id="{63FDC4DB-8938-E46C-7AF2-BCB3C450ED3C}"/>
               </a:ext>
             </a:extLst>
           </p:cNvPr>
@@ -6947,14 +8094,64 @@
           <a:bodyPr/>
           <a:lstStyle/>
           <a:p>
-            <a:endParaRPr lang="en-MX"/>
+            <a:r>
+              <a:rPr lang="en-MX" dirty="0"/>
+              <a:t>Backtracking</a:t>
+            </a:r>
+            <a:endParaRPr lang="en-US" dirty="0"/>
+          </a:p>
+          <a:p>
+            <a:r>
+              <a:rPr lang="en-US" dirty="0"/>
+              <a:t>P</a:t>
+            </a:r>
+            <a:r>
+              <a:rPr lang="en-MX" dirty="0"/>
+              <a:t>ropagacion de restricciones</a:t>
+            </a:r>
+          </a:p>
+          <a:p>
+            <a:r>
+              <a:rPr lang="es-ES" dirty="0"/>
+              <a:t>Recocido simulado</a:t>
+            </a:r>
+            <a:endParaRPr lang="en-MX" dirty="0"/>
+          </a:p>
+          <a:p>
+            <a:r>
+              <a:rPr lang="es-ES_tradnl" dirty="0"/>
+              <a:t>Algoritmos</a:t>
+            </a:r>
+            <a:r>
+              <a:rPr lang="en-US" dirty="0"/>
+              <a:t> e</a:t>
+            </a:r>
+            <a:r>
+              <a:rPr lang="en-MX" dirty="0"/>
+              <a:t>volutivos</a:t>
+            </a:r>
+          </a:p>
+          <a:p>
+            <a:r>
+              <a:rPr lang="en-US" dirty="0"/>
+              <a:t>AC-3 algorithm</a:t>
+            </a:r>
+          </a:p>
+          <a:p>
+            <a:br>
+              <a:rPr lang="en-US" dirty="0"/>
+            </a:br>
+            <a:endParaRPr lang="en-MX" dirty="0"/>
+          </a:p>
+          <a:p>
+            <a:endParaRPr lang="en-MX" dirty="0"/>
           </a:p>
         </p:txBody>
       </p:sp>
     </p:spTree>
     <p:extLst>
       <p:ext uri="{BB962C8B-B14F-4D97-AF65-F5344CB8AC3E}">
-        <p14:creationId xmlns:p14="http://schemas.microsoft.com/office/powerpoint/2010/main" val="1998731749"/>
+        <p14:creationId xmlns:p14="http://schemas.microsoft.com/office/powerpoint/2010/main" val="2918832171"/>
       </p:ext>
     </p:extLst>
   </p:cSld>
@@ -6986,7 +8183,7 @@
           <p:cNvPr id="2" name="Title 1">
             <a:extLst>
               <a:ext uri="{FF2B5EF4-FFF2-40B4-BE49-F238E27FC236}">
-                <a16:creationId xmlns:a16="http://schemas.microsoft.com/office/drawing/2014/main" id="{19B59A8E-2F4A-2A58-50EE-006638771964}"/>
+                <a16:creationId xmlns:a16="http://schemas.microsoft.com/office/drawing/2014/main" id="{C0C6A2D4-DE72-9248-E717-9B45411F3951}"/>
               </a:ext>
             </a:extLst>
           </p:cNvPr>
@@ -6999,14 +8196,12 @@
         </p:nvSpPr>
         <p:spPr/>
         <p:txBody>
-          <a:bodyPr>
-            <a:normAutofit fontScale="90000"/>
-          </a:bodyPr>
+          <a:bodyPr/>
           <a:lstStyle/>
           <a:p>
             <a:r>
               <a:rPr lang="en-MX"/>
-              <a:t>Replicando la funcionalidad de propagacion de restricciones</a:t>
+              <a:t>Intentos </a:t>
             </a:r>
           </a:p>
         </p:txBody>
@@ -7016,7 +8211,7 @@
           <p:cNvPr id="3" name="Content Placeholder 2">
             <a:extLst>
               <a:ext uri="{FF2B5EF4-FFF2-40B4-BE49-F238E27FC236}">
-                <a16:creationId xmlns:a16="http://schemas.microsoft.com/office/drawing/2014/main" id="{C53BFB3D-E623-87B2-400B-2460BD97A40C}"/>
+                <a16:creationId xmlns:a16="http://schemas.microsoft.com/office/drawing/2014/main" id="{197A3465-25C8-F420-F59F-B47C95AC441A}"/>
               </a:ext>
             </a:extLst>
           </p:cNvPr>
@@ -7039,7 +8234,7 @@
     </p:spTree>
     <p:extLst>
       <p:ext uri="{BB962C8B-B14F-4D97-AF65-F5344CB8AC3E}">
-        <p14:creationId xmlns:p14="http://schemas.microsoft.com/office/powerpoint/2010/main" val="2501368927"/>
+        <p14:creationId xmlns:p14="http://schemas.microsoft.com/office/powerpoint/2010/main" val="122469425"/>
       </p:ext>
     </p:extLst>
   </p:cSld>
@@ -7071,7 +8266,7 @@
           <p:cNvPr id="2" name="Title 1">
             <a:extLst>
               <a:ext uri="{FF2B5EF4-FFF2-40B4-BE49-F238E27FC236}">
-                <a16:creationId xmlns:a16="http://schemas.microsoft.com/office/drawing/2014/main" id="{E41A817E-F51B-CC91-0552-CD6F17FBE6B5}"/>
+                <a16:creationId xmlns:a16="http://schemas.microsoft.com/office/drawing/2014/main" id="{956CB1D9-A917-7DA5-5FB9-CA4E6BAD5E3F}"/>
               </a:ext>
             </a:extLst>
           </p:cNvPr>
@@ -7080,6 +8275,36 @@
           </p:cNvSpPr>
           <p:nvPr>
             <p:ph type="title"/>
+          </p:nvPr>
+        </p:nvSpPr>
+        <p:spPr/>
+        <p:txBody>
+          <a:bodyPr>
+            <a:normAutofit fontScale="90000"/>
+          </a:bodyPr>
+          <a:lstStyle/>
+          <a:p>
+            <a:r>
+              <a:rPr lang="en-MX" dirty="0"/>
+              <a:t>Propagación de restricciones e investigacion de operaciones</a:t>
+            </a:r>
+          </a:p>
+        </p:txBody>
+      </p:sp>
+      <p:sp>
+        <p:nvSpPr>
+          <p:cNvPr id="3" name="Content Placeholder 2">
+            <a:extLst>
+              <a:ext uri="{FF2B5EF4-FFF2-40B4-BE49-F238E27FC236}">
+                <a16:creationId xmlns:a16="http://schemas.microsoft.com/office/drawing/2014/main" id="{6752A18D-12CF-A580-465E-B3C00B368E97}"/>
+              </a:ext>
+            </a:extLst>
+          </p:cNvPr>
+          <p:cNvSpPr>
+            <a:spLocks noGrp="1"/>
+          </p:cNvSpPr>
+          <p:nvPr>
+            <p:ph idx="1"/>
           </p:nvPr>
         </p:nvSpPr>
         <p:spPr/>
@@ -7091,35 +8316,10 @@
           </a:p>
         </p:txBody>
       </p:sp>
-      <p:sp>
-        <p:nvSpPr>
-          <p:cNvPr id="3" name="Content Placeholder 2">
-            <a:extLst>
-              <a:ext uri="{FF2B5EF4-FFF2-40B4-BE49-F238E27FC236}">
-                <a16:creationId xmlns:a16="http://schemas.microsoft.com/office/drawing/2014/main" id="{63BA54E2-05BE-062F-5E34-D20774305F1C}"/>
-              </a:ext>
-            </a:extLst>
-          </p:cNvPr>
-          <p:cNvSpPr>
-            <a:spLocks noGrp="1"/>
-          </p:cNvSpPr>
-          <p:nvPr>
-            <p:ph idx="1"/>
-          </p:nvPr>
-        </p:nvSpPr>
-        <p:spPr/>
-        <p:txBody>
-          <a:bodyPr/>
-          <a:lstStyle/>
-          <a:p>
-            <a:endParaRPr lang="en-MX"/>
-          </a:p>
-        </p:txBody>
-      </p:sp>
     </p:spTree>
     <p:extLst>
       <p:ext uri="{BB962C8B-B14F-4D97-AF65-F5344CB8AC3E}">
-        <p14:creationId xmlns:p14="http://schemas.microsoft.com/office/powerpoint/2010/main" val="4090102367"/>
+        <p14:creationId xmlns:p14="http://schemas.microsoft.com/office/powerpoint/2010/main" val="1998731749"/>
       </p:ext>
     </p:extLst>
   </p:cSld>

</xml_diff>